<commit_message>
- Modif for Loops
</commit_message>
<xml_diff>
--- a/20-03-2012/presentation/Initiation au Coding Dojo.pptx
+++ b/20-03-2012/presentation/Initiation au Coding Dojo.pptx
@@ -20,7 +20,6 @@
     <p:sldId id="269" r:id="rId14"/>
     <p:sldId id="268" r:id="rId15"/>
     <p:sldId id="270" r:id="rId16"/>
-    <p:sldId id="271" r:id="rId17"/>
   </p:sldIdLst>
   <p:sldSz cx="9144000" cy="6858000" type="screen4x3"/>
   <p:notesSz cx="6858000" cy="9144000"/>
@@ -312,7 +311,8 @@
           <a:p>
             <a:fld id="{30DDEB85-F574-AC46-BA98-E11988E482A5}" type="datetimeFigureOut">
               <a:rPr lang="fr-FR" smtClean="0"/>
-              <a:t>19/03/12</a:t>
+              <a:pPr/>
+              <a:t>30/05/12</a:t>
             </a:fld>
             <a:endParaRPr lang="fr-FR"/>
           </a:p>
@@ -354,6 +354,7 @@
           <a:p>
             <a:fld id="{F6562032-ECE4-764F-BD42-9DB19F39442F}" type="slidenum">
               <a:rPr lang="fr-FR" smtClean="0"/>
+              <a:pPr/>
               <a:t>‹#›</a:t>
             </a:fld>
             <a:endParaRPr lang="fr-FR"/>
@@ -542,7 +543,8 @@
           <a:p>
             <a:fld id="{30DDEB85-F574-AC46-BA98-E11988E482A5}" type="datetimeFigureOut">
               <a:rPr lang="fr-FR" smtClean="0"/>
-              <a:t>19/03/12</a:t>
+              <a:pPr/>
+              <a:t>30/05/12</a:t>
             </a:fld>
             <a:endParaRPr lang="fr-FR"/>
           </a:p>
@@ -584,6 +586,7 @@
           <a:p>
             <a:fld id="{F6562032-ECE4-764F-BD42-9DB19F39442F}" type="slidenum">
               <a:rPr lang="fr-FR" smtClean="0"/>
+              <a:pPr/>
               <a:t>‹#›</a:t>
             </a:fld>
             <a:endParaRPr lang="fr-FR"/>
@@ -777,7 +780,8 @@
           <a:p>
             <a:fld id="{30DDEB85-F574-AC46-BA98-E11988E482A5}" type="datetimeFigureOut">
               <a:rPr lang="fr-FR" smtClean="0"/>
-              <a:t>19/03/12</a:t>
+              <a:pPr/>
+              <a:t>30/05/12</a:t>
             </a:fld>
             <a:endParaRPr lang="fr-FR"/>
           </a:p>
@@ -819,6 +823,7 @@
           <a:p>
             <a:fld id="{F6562032-ECE4-764F-BD42-9DB19F39442F}" type="slidenum">
               <a:rPr lang="fr-FR" smtClean="0"/>
+              <a:pPr/>
               <a:t>‹#›</a:t>
             </a:fld>
             <a:endParaRPr lang="fr-FR"/>
@@ -952,7 +957,8 @@
           <a:p>
             <a:fld id="{30DDEB85-F574-AC46-BA98-E11988E482A5}" type="datetimeFigureOut">
               <a:rPr lang="fr-FR" smtClean="0"/>
-              <a:t>19/03/12</a:t>
+              <a:pPr/>
+              <a:t>30/05/12</a:t>
             </a:fld>
             <a:endParaRPr lang="fr-FR"/>
           </a:p>
@@ -994,6 +1000,7 @@
           <a:p>
             <a:fld id="{F6562032-ECE4-764F-BD42-9DB19F39442F}" type="slidenum">
               <a:rPr lang="fr-FR" smtClean="0"/>
+              <a:pPr/>
               <a:t>‹#›</a:t>
             </a:fld>
             <a:endParaRPr lang="fr-FR"/>
@@ -1117,7 +1124,8 @@
           <a:p>
             <a:fld id="{30DDEB85-F574-AC46-BA98-E11988E482A5}" type="datetimeFigureOut">
               <a:rPr lang="fr-FR" smtClean="0"/>
-              <a:t>19/03/12</a:t>
+              <a:pPr/>
+              <a:t>30/05/12</a:t>
             </a:fld>
             <a:endParaRPr lang="fr-FR"/>
           </a:p>
@@ -1159,6 +1167,7 @@
           <a:p>
             <a:fld id="{F6562032-ECE4-764F-BD42-9DB19F39442F}" type="slidenum">
               <a:rPr lang="fr-FR" smtClean="0"/>
+              <a:pPr/>
               <a:t>‹#›</a:t>
             </a:fld>
             <a:endParaRPr lang="fr-FR"/>
@@ -1362,7 +1371,7 @@
             <a:fld id="{AA02828B-7CC3-45C2-A6E2-84E4D1484058}" type="datetime1">
               <a:rPr lang="fr-FR" smtClean="0"/>
               <a:pPr/>
-              <a:t>19/03/12</a:t>
+              <a:t>30/05/12</a:t>
             </a:fld>
             <a:endParaRPr lang="fr-FR"/>
           </a:p>
@@ -1655,7 +1664,8 @@
           <a:p>
             <a:fld id="{30DDEB85-F574-AC46-BA98-E11988E482A5}" type="datetimeFigureOut">
               <a:rPr lang="fr-FR" smtClean="0"/>
-              <a:t>19/03/12</a:t>
+              <a:pPr/>
+              <a:t>30/05/12</a:t>
             </a:fld>
             <a:endParaRPr lang="fr-FR"/>
           </a:p>
@@ -1697,6 +1707,7 @@
           <a:p>
             <a:fld id="{F6562032-ECE4-764F-BD42-9DB19F39442F}" type="slidenum">
               <a:rPr lang="fr-FR" smtClean="0"/>
+              <a:pPr/>
               <a:t>‹#›</a:t>
             </a:fld>
             <a:endParaRPr lang="fr-FR"/>
@@ -2091,7 +2102,8 @@
           <a:p>
             <a:fld id="{30DDEB85-F574-AC46-BA98-E11988E482A5}" type="datetimeFigureOut">
               <a:rPr lang="fr-FR" smtClean="0"/>
-              <a:t>19/03/12</a:t>
+              <a:pPr/>
+              <a:t>30/05/12</a:t>
             </a:fld>
             <a:endParaRPr lang="fr-FR"/>
           </a:p>
@@ -2133,6 +2145,7 @@
           <a:p>
             <a:fld id="{F6562032-ECE4-764F-BD42-9DB19F39442F}" type="slidenum">
               <a:rPr lang="fr-FR" smtClean="0"/>
+              <a:pPr/>
               <a:t>‹#›</a:t>
             </a:fld>
             <a:endParaRPr lang="fr-FR"/>
@@ -2204,7 +2217,8 @@
           <a:p>
             <a:fld id="{30DDEB85-F574-AC46-BA98-E11988E482A5}" type="datetimeFigureOut">
               <a:rPr lang="fr-FR" smtClean="0"/>
-              <a:t>19/03/12</a:t>
+              <a:pPr/>
+              <a:t>30/05/12</a:t>
             </a:fld>
             <a:endParaRPr lang="fr-FR"/>
           </a:p>
@@ -2246,6 +2260,7 @@
           <a:p>
             <a:fld id="{F6562032-ECE4-764F-BD42-9DB19F39442F}" type="slidenum">
               <a:rPr lang="fr-FR" smtClean="0"/>
+              <a:pPr/>
               <a:t>‹#›</a:t>
             </a:fld>
             <a:endParaRPr lang="fr-FR"/>
@@ -2294,7 +2309,8 @@
           <a:p>
             <a:fld id="{30DDEB85-F574-AC46-BA98-E11988E482A5}" type="datetimeFigureOut">
               <a:rPr lang="fr-FR" smtClean="0"/>
-              <a:t>19/03/12</a:t>
+              <a:pPr/>
+              <a:t>30/05/12</a:t>
             </a:fld>
             <a:endParaRPr lang="fr-FR"/>
           </a:p>
@@ -2336,6 +2352,7 @@
           <a:p>
             <a:fld id="{F6562032-ECE4-764F-BD42-9DB19F39442F}" type="slidenum">
               <a:rPr lang="fr-FR" smtClean="0"/>
+              <a:pPr/>
               <a:t>‹#›</a:t>
             </a:fld>
             <a:endParaRPr lang="fr-FR"/>
@@ -2575,7 +2592,8 @@
           <a:p>
             <a:fld id="{30DDEB85-F574-AC46-BA98-E11988E482A5}" type="datetimeFigureOut">
               <a:rPr lang="fr-FR" smtClean="0"/>
-              <a:t>19/03/12</a:t>
+              <a:pPr/>
+              <a:t>30/05/12</a:t>
             </a:fld>
             <a:endParaRPr lang="fr-FR"/>
           </a:p>
@@ -2617,6 +2635,7 @@
           <a:p>
             <a:fld id="{F6562032-ECE4-764F-BD42-9DB19F39442F}" type="slidenum">
               <a:rPr lang="fr-FR" smtClean="0"/>
+              <a:pPr/>
               <a:t>‹#›</a:t>
             </a:fld>
             <a:endParaRPr lang="fr-FR"/>
@@ -2877,7 +2896,8 @@
           <a:p>
             <a:fld id="{30DDEB85-F574-AC46-BA98-E11988E482A5}" type="datetimeFigureOut">
               <a:rPr lang="fr-FR" smtClean="0"/>
-              <a:t>19/03/12</a:t>
+              <a:pPr/>
+              <a:t>30/05/12</a:t>
             </a:fld>
             <a:endParaRPr lang="fr-FR"/>
           </a:p>
@@ -2919,6 +2939,7 @@
           <a:p>
             <a:fld id="{F6562032-ECE4-764F-BD42-9DB19F39442F}" type="slidenum">
               <a:rPr lang="fr-FR" smtClean="0"/>
+              <a:pPr/>
               <a:t>‹#›</a:t>
             </a:fld>
             <a:endParaRPr lang="fr-FR"/>
@@ -3083,7 +3104,8 @@
           <a:p>
             <a:fld id="{30DDEB85-F574-AC46-BA98-E11988E482A5}" type="datetimeFigureOut">
               <a:rPr lang="fr-FR" smtClean="0"/>
-              <a:t>19/03/12</a:t>
+              <a:pPr/>
+              <a:t>30/05/12</a:t>
             </a:fld>
             <a:endParaRPr lang="fr-FR"/>
           </a:p>
@@ -3157,6 +3179,7 @@
           <a:p>
             <a:fld id="{F6562032-ECE4-764F-BD42-9DB19F39442F}" type="slidenum">
               <a:rPr lang="fr-FR" smtClean="0"/>
+              <a:pPr/>
               <a:t>‹#›</a:t>
             </a:fld>
             <a:endParaRPr lang="fr-FR"/>
@@ -3587,11 +3610,7 @@
           <a:p>
             <a:r>
               <a:rPr lang="fr-FR" dirty="0" smtClean="0"/>
-              <a:t>Andr</a:t>
-            </a:r>
-            <a:r>
-              <a:rPr lang="fr-FR" dirty="0" smtClean="0"/>
-              <a:t>é Fonseca</a:t>
+              <a:t>André Fonseca</a:t>
             </a:r>
             <a:endParaRPr lang="fr-FR" dirty="0"/>
           </a:p>
@@ -4271,13 +4290,7 @@
               <a:rPr lang="fr-FR" sz="3200" b="1" dirty="0" smtClean="0">
                 <a:sym typeface="Wingdings"/>
               </a:rPr>
-              <a:t>http</a:t>
-            </a:r>
-            <a:r>
-              <a:rPr lang="fr-FR" sz="3200" b="1" dirty="0" smtClean="0">
-                <a:sym typeface="Wingdings"/>
-              </a:rPr>
-              <a:t>://</a:t>
+              <a:t>http://</a:t>
             </a:r>
             <a:r>
               <a:rPr lang="fr-FR" sz="3200" b="1" dirty="0" err="1" smtClean="0">
@@ -4442,11 +4455,7 @@
           <a:p>
             <a:r>
               <a:rPr lang="fr-FR" dirty="0" smtClean="0"/>
-              <a:t>Andr</a:t>
-            </a:r>
-            <a:r>
-              <a:rPr lang="fr-FR" dirty="0" smtClean="0"/>
-              <a:t>é Fonseca</a:t>
+              <a:t>André Fonseca</a:t>
             </a:r>
             <a:endParaRPr lang="fr-FR" dirty="0"/>
           </a:p>
@@ -4494,7 +4503,11 @@
           <a:p>
             <a:r>
               <a:rPr lang="fr-FR" dirty="0" smtClean="0"/>
-              <a:t>Our first Kata!</a:t>
+              <a:t>Our first</a:t>
+            </a:r>
+            <a:r>
+              <a:rPr lang="fr-FR" dirty="0" smtClean="0"/>
+              <a:t> chalenge!</a:t>
             </a:r>
             <a:endParaRPr lang="fr-FR" dirty="0"/>
           </a:p>
@@ -4545,11 +4558,7 @@
             </a:r>
             <a:r>
               <a:rPr lang="fr-FR" b="1" dirty="0" smtClean="0"/>
-              <a:t> of the </a:t>
-            </a:r>
-            <a:r>
-              <a:rPr lang="fr-FR" b="1" dirty="0" smtClean="0"/>
-              <a:t>« Roman </a:t>
+              <a:t> of the « Roman </a:t>
             </a:r>
             <a:r>
               <a:rPr lang="fr-FR" b="1" dirty="0" err="1" smtClean="0"/>
@@ -4586,93 +4595,6 @@
           </a:prstGeom>
         </p:spPr>
       </p:pic>
-    </p:spTree>
-  </p:cSld>
-  <p:clrMapOvr>
-    <a:masterClrMapping/>
-  </p:clrMapOvr>
-</p:sld>
-</file>
-
-<file path=ppt/slides/slide16.xml><?xml version="1.0" encoding="utf-8"?>
-<p:sld xmlns:a="http://schemas.openxmlformats.org/drawingml/2006/main" xmlns:r="http://schemas.openxmlformats.org/officeDocument/2006/relationships" xmlns:mc="http://schemas.openxmlformats.org/markup-compatibility/2006" xmlns:mv="urn:schemas-microsoft-com:mac:vml" xmlns:p="http://schemas.openxmlformats.org/presentationml/2006/main" mc:Ignorable="mv" mc:PreserveAttributes="mv:*">
-  <p:cSld>
-    <p:spTree>
-      <p:nvGrpSpPr>
-        <p:cNvPr id="1" name=""/>
-        <p:cNvGrpSpPr/>
-        <p:nvPr/>
-      </p:nvGrpSpPr>
-      <p:grpSpPr>
-        <a:xfrm>
-          <a:off x="0" y="0"/>
-          <a:ext cx="0" cy="0"/>
-          <a:chOff x="0" y="0"/>
-          <a:chExt cx="0" cy="0"/>
-        </a:xfrm>
-      </p:grpSpPr>
-      <p:sp>
-        <p:nvSpPr>
-          <p:cNvPr id="2" name="Titre 1"/>
-          <p:cNvSpPr>
-            <a:spLocks noGrp="1"/>
-          </p:cNvSpPr>
-          <p:nvPr>
-            <p:ph type="title"/>
-          </p:nvPr>
-        </p:nvSpPr>
-        <p:spPr/>
-        <p:txBody>
-          <a:bodyPr/>
-          <a:lstStyle/>
-          <a:p>
-            <a:r>
-              <a:rPr lang="fr-FR" dirty="0" smtClean="0"/>
-              <a:t>But, </a:t>
-            </a:r>
-            <a:r>
-              <a:rPr lang="fr-FR" dirty="0" err="1" smtClean="0"/>
-              <a:t>at</a:t>
-            </a:r>
-            <a:r>
-              <a:rPr lang="fr-FR" dirty="0" smtClean="0"/>
-              <a:t> first…</a:t>
-            </a:r>
-            <a:endParaRPr lang="fr-FR" dirty="0"/>
-          </a:p>
-        </p:txBody>
-      </p:sp>
-      <p:sp>
-        <p:nvSpPr>
-          <p:cNvPr id="3" name="Espace réservé du contenu 2"/>
-          <p:cNvSpPr>
-            <a:spLocks noGrp="1"/>
-          </p:cNvSpPr>
-          <p:nvPr>
-            <p:ph idx="1"/>
-          </p:nvPr>
-        </p:nvSpPr>
-        <p:spPr/>
-        <p:txBody>
-          <a:bodyPr/>
-          <a:lstStyle/>
-          <a:p>
-            <a:r>
-              <a:rPr lang="fr-FR" dirty="0" smtClean="0"/>
-              <a:t>The Ruby </a:t>
-            </a:r>
-            <a:r>
-              <a:rPr lang="fr-FR" dirty="0" err="1" smtClean="0"/>
-              <a:t>language</a:t>
-            </a:r>
-            <a:r>
-              <a:rPr lang="fr-FR" smtClean="0"/>
-              <a:t>:</a:t>
-            </a:r>
-            <a:endParaRPr lang="fr-FR" dirty="0"/>
-          </a:p>
-        </p:txBody>
-      </p:sp>
     </p:spTree>
   </p:cSld>
   <p:clrMapOvr>

</xml_diff>